<commit_message>
Prepare final dashboard and presentation
</commit_message>
<xml_diff>
--- a/cep_final_presentation.pptx
+++ b/cep_final_presentation.pptx
@@ -7,18 +7,19 @@
   <p:sldIdLst>
     <p:sldId id="256" r:id="rId2"/>
     <p:sldId id="257" r:id="rId3"/>
-    <p:sldId id="259" r:id="rId4"/>
-    <p:sldId id="266" r:id="rId5"/>
-    <p:sldId id="267" r:id="rId6"/>
-    <p:sldId id="268" r:id="rId7"/>
-    <p:sldId id="269" r:id="rId8"/>
-    <p:sldId id="258" r:id="rId9"/>
-    <p:sldId id="260" r:id="rId10"/>
-    <p:sldId id="261" r:id="rId11"/>
-    <p:sldId id="262" r:id="rId12"/>
-    <p:sldId id="263" r:id="rId13"/>
-    <p:sldId id="264" r:id="rId14"/>
-    <p:sldId id="265" r:id="rId15"/>
+    <p:sldId id="270" r:id="rId4"/>
+    <p:sldId id="259" r:id="rId5"/>
+    <p:sldId id="266" r:id="rId6"/>
+    <p:sldId id="267" r:id="rId7"/>
+    <p:sldId id="268" r:id="rId8"/>
+    <p:sldId id="269" r:id="rId9"/>
+    <p:sldId id="258" r:id="rId10"/>
+    <p:sldId id="260" r:id="rId11"/>
+    <p:sldId id="261" r:id="rId12"/>
+    <p:sldId id="262" r:id="rId13"/>
+    <p:sldId id="263" r:id="rId14"/>
+    <p:sldId id="264" r:id="rId15"/>
+    <p:sldId id="265" r:id="rId16"/>
   </p:sldIdLst>
   <p:sldSz cx="12192000" cy="6858000"/>
   <p:notesSz cx="6858000" cy="9144000"/>
@@ -117,15 +118,88 @@
       </a:defRPr>
     </a:lvl9pPr>
   </p:defaultTextStyle>
+  <p:extLst>
+    <p:ext uri="{EFAFB233-063F-42B5-8137-9DF3F51BA10A}">
+      <p15:sldGuideLst xmlns:p15="http://schemas.microsoft.com/office/powerpoint/2012/main"/>
+    </p:ext>
+  </p:extLst>
 </p:presentation>
 </file>
 
 <file path=ppt/revisionInfo.xml><?xml version="1.0" encoding="utf-8"?>
 <p1510:revInfo xmlns:a="http://schemas.openxmlformats.org/drawingml/2006/main" xmlns:r="http://schemas.openxmlformats.org/officeDocument/2006/relationships" xmlns:p1510="http://schemas.microsoft.com/office/powerpoint/2015/10/main">
   <p1510:revLst>
-    <p1510:client id="{FAF83CA4-2811-0741-BC82-3310D0D8B640}" v="5" dt="2024-12-03T22:52:18.449"/>
+    <p1510:client id="{FAF83CA4-2811-0741-BC82-3310D0D8B640}" v="6" dt="2024-12-04T11:46:13.387"/>
   </p1510:revLst>
 </p1510:revInfo>
+</file>
+
+<file path=ppt/changesInfos/changesInfo1.xml><?xml version="1.0" encoding="utf-8"?>
+<pc:chgInfo xmlns:a="http://schemas.openxmlformats.org/drawingml/2006/main" xmlns:r="http://schemas.openxmlformats.org/officeDocument/2006/relationships" xmlns:ac="http://schemas.microsoft.com/office/drawing/2013/main/command" xmlns:pc="http://schemas.microsoft.com/office/powerpoint/2013/main/command">
+  <pc:docChgLst>
+    <pc:chgData name="Alghwiri, Alaa" userId="3d6f81cf-7d01-4ece-ade9-4290205c268f" providerId="ADAL" clId="{FAF83CA4-2811-0741-BC82-3310D0D8B640}"/>
+    <pc:docChg chg="undo custSel addSld modSld">
+      <pc:chgData name="Alghwiri, Alaa" userId="3d6f81cf-7d01-4ece-ade9-4290205c268f" providerId="ADAL" clId="{FAF83CA4-2811-0741-BC82-3310D0D8B640}" dt="2024-12-04T11:58:10.369" v="527" actId="20577"/>
+      <pc:docMkLst>
+        <pc:docMk/>
+      </pc:docMkLst>
+      <pc:sldChg chg="modSp mod">
+        <pc:chgData name="Alghwiri, Alaa" userId="3d6f81cf-7d01-4ece-ade9-4290205c268f" providerId="ADAL" clId="{FAF83CA4-2811-0741-BC82-3310D0D8B640}" dt="2024-12-04T11:58:10.369" v="527" actId="20577"/>
+        <pc:sldMkLst>
+          <pc:docMk/>
+          <pc:sldMk cId="3827588782" sldId="259"/>
+        </pc:sldMkLst>
+        <pc:spChg chg="mod">
+          <ac:chgData name="Alghwiri, Alaa" userId="3d6f81cf-7d01-4ece-ade9-4290205c268f" providerId="ADAL" clId="{FAF83CA4-2811-0741-BC82-3310D0D8B640}" dt="2024-12-04T11:58:10.369" v="527" actId="20577"/>
+          <ac:spMkLst>
+            <pc:docMk/>
+            <pc:sldMk cId="3827588782" sldId="259"/>
+            <ac:spMk id="2" creationId="{BB6AFBBD-8FA8-B6F7-6FA6-618EED8DB698}"/>
+          </ac:spMkLst>
+        </pc:spChg>
+        <pc:picChg chg="mod">
+          <ac:chgData name="Alghwiri, Alaa" userId="3d6f81cf-7d01-4ece-ade9-4290205c268f" providerId="ADAL" clId="{FAF83CA4-2811-0741-BC82-3310D0D8B640}" dt="2024-12-04T11:57:07.497" v="498" actId="14100"/>
+          <ac:picMkLst>
+            <pc:docMk/>
+            <pc:sldMk cId="3827588782" sldId="259"/>
+            <ac:picMk id="4" creationId="{A8B09357-474B-A92C-9908-58D7AD89E83B}"/>
+          </ac:picMkLst>
+        </pc:picChg>
+      </pc:sldChg>
+      <pc:sldChg chg="addSp delSp modSp new mod">
+        <pc:chgData name="Alghwiri, Alaa" userId="3d6f81cf-7d01-4ece-ade9-4290205c268f" providerId="ADAL" clId="{FAF83CA4-2811-0741-BC82-3310D0D8B640}" dt="2024-12-04T11:56:32.703" v="496" actId="20577"/>
+        <pc:sldMkLst>
+          <pc:docMk/>
+          <pc:sldMk cId="4229819415" sldId="270"/>
+        </pc:sldMkLst>
+        <pc:spChg chg="mod">
+          <ac:chgData name="Alghwiri, Alaa" userId="3d6f81cf-7d01-4ece-ade9-4290205c268f" providerId="ADAL" clId="{FAF83CA4-2811-0741-BC82-3310D0D8B640}" dt="2024-12-04T11:46:10.417" v="62" actId="14100"/>
+          <ac:spMkLst>
+            <pc:docMk/>
+            <pc:sldMk cId="4229819415" sldId="270"/>
+            <ac:spMk id="2" creationId="{FFD56607-90CA-5EA2-105F-7576AC90879C}"/>
+          </ac:spMkLst>
+        </pc:spChg>
+        <pc:spChg chg="mod">
+          <ac:chgData name="Alghwiri, Alaa" userId="3d6f81cf-7d01-4ece-ade9-4290205c268f" providerId="ADAL" clId="{FAF83CA4-2811-0741-BC82-3310D0D8B640}" dt="2024-12-04T11:56:32.703" v="496" actId="20577"/>
+          <ac:spMkLst>
+            <pc:docMk/>
+            <pc:sldMk cId="4229819415" sldId="270"/>
+            <ac:spMk id="3" creationId="{BB679AE4-FBBF-0389-450E-F047CEBD42A1}"/>
+          </ac:spMkLst>
+        </pc:spChg>
+        <pc:spChg chg="add del mod">
+          <ac:chgData name="Alghwiri, Alaa" userId="3d6f81cf-7d01-4ece-ade9-4290205c268f" providerId="ADAL" clId="{FAF83CA4-2811-0741-BC82-3310D0D8B640}" dt="2024-12-04T11:46:22.641" v="74"/>
+          <ac:spMkLst>
+            <pc:docMk/>
+            <pc:sldMk cId="4229819415" sldId="270"/>
+            <ac:spMk id="4" creationId="{61E37737-E7C6-4AB0-ABEF-F18C5921E71F}"/>
+          </ac:spMkLst>
+        </pc:spChg>
+      </pc:sldChg>
+    </pc:docChg>
+  </pc:docChgLst>
+</pc:chgInfo>
 </file>
 
 <file path=ppt/slideLayouts/slideLayout1.xml><?xml version="1.0" encoding="utf-8"?>
@@ -275,7 +349,7 @@
           <a:p>
             <a:fld id="{3EBDDDBF-5A02-AD4F-A64E-6D90968F954C}" type="datetimeFigureOut">
               <a:rPr lang="en-US" smtClean="0"/>
-              <a:t>12/3/24</a:t>
+              <a:t>12/4/24</a:t>
             </a:fld>
             <a:endParaRPr lang="en-US"/>
           </a:p>
@@ -473,7 +547,7 @@
           <a:p>
             <a:fld id="{3EBDDDBF-5A02-AD4F-A64E-6D90968F954C}" type="datetimeFigureOut">
               <a:rPr lang="en-US" smtClean="0"/>
-              <a:t>12/3/24</a:t>
+              <a:t>12/4/24</a:t>
             </a:fld>
             <a:endParaRPr lang="en-US"/>
           </a:p>
@@ -681,7 +755,7 @@
           <a:p>
             <a:fld id="{3EBDDDBF-5A02-AD4F-A64E-6D90968F954C}" type="datetimeFigureOut">
               <a:rPr lang="en-US" smtClean="0"/>
-              <a:t>12/3/24</a:t>
+              <a:t>12/4/24</a:t>
             </a:fld>
             <a:endParaRPr lang="en-US"/>
           </a:p>
@@ -879,7 +953,7 @@
           <a:p>
             <a:fld id="{3EBDDDBF-5A02-AD4F-A64E-6D90968F954C}" type="datetimeFigureOut">
               <a:rPr lang="en-US" smtClean="0"/>
-              <a:t>12/3/24</a:t>
+              <a:t>12/4/24</a:t>
             </a:fld>
             <a:endParaRPr lang="en-US"/>
           </a:p>
@@ -1154,7 +1228,7 @@
           <a:p>
             <a:fld id="{3EBDDDBF-5A02-AD4F-A64E-6D90968F954C}" type="datetimeFigureOut">
               <a:rPr lang="en-US" smtClean="0"/>
-              <a:t>12/3/24</a:t>
+              <a:t>12/4/24</a:t>
             </a:fld>
             <a:endParaRPr lang="en-US"/>
           </a:p>
@@ -1419,7 +1493,7 @@
           <a:p>
             <a:fld id="{3EBDDDBF-5A02-AD4F-A64E-6D90968F954C}" type="datetimeFigureOut">
               <a:rPr lang="en-US" smtClean="0"/>
-              <a:t>12/3/24</a:t>
+              <a:t>12/4/24</a:t>
             </a:fld>
             <a:endParaRPr lang="en-US"/>
           </a:p>
@@ -1831,7 +1905,7 @@
           <a:p>
             <a:fld id="{3EBDDDBF-5A02-AD4F-A64E-6D90968F954C}" type="datetimeFigureOut">
               <a:rPr lang="en-US" smtClean="0"/>
-              <a:t>12/3/24</a:t>
+              <a:t>12/4/24</a:t>
             </a:fld>
             <a:endParaRPr lang="en-US"/>
           </a:p>
@@ -1972,7 +2046,7 @@
           <a:p>
             <a:fld id="{3EBDDDBF-5A02-AD4F-A64E-6D90968F954C}" type="datetimeFigureOut">
               <a:rPr lang="en-US" smtClean="0"/>
-              <a:t>12/3/24</a:t>
+              <a:t>12/4/24</a:t>
             </a:fld>
             <a:endParaRPr lang="en-US"/>
           </a:p>
@@ -2085,7 +2159,7 @@
           <a:p>
             <a:fld id="{3EBDDDBF-5A02-AD4F-A64E-6D90968F954C}" type="datetimeFigureOut">
               <a:rPr lang="en-US" smtClean="0"/>
-              <a:t>12/3/24</a:t>
+              <a:t>12/4/24</a:t>
             </a:fld>
             <a:endParaRPr lang="en-US"/>
           </a:p>
@@ -2396,7 +2470,7 @@
           <a:p>
             <a:fld id="{3EBDDDBF-5A02-AD4F-A64E-6D90968F954C}" type="datetimeFigureOut">
               <a:rPr lang="en-US" smtClean="0"/>
-              <a:t>12/3/24</a:t>
+              <a:t>12/4/24</a:t>
             </a:fld>
             <a:endParaRPr lang="en-US"/>
           </a:p>
@@ -2684,7 +2758,7 @@
           <a:p>
             <a:fld id="{3EBDDDBF-5A02-AD4F-A64E-6D90968F954C}" type="datetimeFigureOut">
               <a:rPr lang="en-US" smtClean="0"/>
-              <a:t>12/3/24</a:t>
+              <a:t>12/4/24</a:t>
             </a:fld>
             <a:endParaRPr lang="en-US"/>
           </a:p>
@@ -2925,7 +2999,7 @@
           <a:p>
             <a:fld id="{3EBDDDBF-5A02-AD4F-A64E-6D90968F954C}" type="datetimeFigureOut">
               <a:rPr lang="en-US" smtClean="0"/>
-              <a:t>12/3/24</a:t>
+              <a:t>12/4/24</a:t>
             </a:fld>
             <a:endParaRPr lang="en-US"/>
           </a:p>
@@ -3427,6 +3501,96 @@
           <p:cNvPr id="2" name="Title 1">
             <a:extLst>
               <a:ext uri="{FF2B5EF4-FFF2-40B4-BE49-F238E27FC236}">
+                <a16:creationId xmlns:a16="http://schemas.microsoft.com/office/drawing/2014/main" id="{FF416512-3780-C9DD-6A53-05CFA6B1EC27}"/>
+              </a:ext>
+            </a:extLst>
+          </p:cNvPr>
+          <p:cNvSpPr>
+            <a:spLocks noGrp="1"/>
+          </p:cNvSpPr>
+          <p:nvPr>
+            <p:ph type="title"/>
+          </p:nvPr>
+        </p:nvSpPr>
+        <p:spPr/>
+        <p:txBody>
+          <a:bodyPr/>
+          <a:lstStyle/>
+          <a:p>
+            <a:r>
+              <a:rPr lang="en-US" dirty="0"/>
+              <a:t>Cross-validation results</a:t>
+            </a:r>
+          </a:p>
+        </p:txBody>
+      </p:sp>
+      <p:pic>
+        <p:nvPicPr>
+          <p:cNvPr id="4" name="Content Placeholder 3">
+            <a:extLst>
+              <a:ext uri="{FF2B5EF4-FFF2-40B4-BE49-F238E27FC236}">
+                <a16:creationId xmlns:a16="http://schemas.microsoft.com/office/drawing/2014/main" id="{9F6AE2F4-BCAE-B306-252F-C9DA15AF4D83}"/>
+              </a:ext>
+            </a:extLst>
+          </p:cNvPr>
+          <p:cNvPicPr>
+            <a:picLocks noGrp="1" noChangeAspect="1"/>
+          </p:cNvPicPr>
+          <p:nvPr>
+            <p:ph idx="1"/>
+          </p:nvPr>
+        </p:nvPicPr>
+        <p:blipFill>
+          <a:blip r:embed="rId2"/>
+          <a:stretch>
+            <a:fillRect/>
+          </a:stretch>
+        </p:blipFill>
+        <p:spPr>
+          <a:xfrm>
+            <a:off x="2657862" y="1405054"/>
+            <a:ext cx="7700842" cy="4950541"/>
+          </a:xfrm>
+          <a:prstGeom prst="rect">
+            <a:avLst/>
+          </a:prstGeom>
+        </p:spPr>
+      </p:pic>
+    </p:spTree>
+    <p:extLst>
+      <p:ext uri="{BB962C8B-B14F-4D97-AF65-F5344CB8AC3E}">
+        <p14:creationId xmlns:p14="http://schemas.microsoft.com/office/powerpoint/2010/main" val="1994282741"/>
+      </p:ext>
+    </p:extLst>
+  </p:cSld>
+  <p:clrMapOvr>
+    <a:masterClrMapping/>
+  </p:clrMapOvr>
+</p:sld>
+</file>
+
+<file path=ppt/slides/slide11.xml><?xml version="1.0" encoding="utf-8"?>
+<p:sld xmlns:a="http://schemas.openxmlformats.org/drawingml/2006/main" xmlns:r="http://schemas.openxmlformats.org/officeDocument/2006/relationships" xmlns:p="http://schemas.openxmlformats.org/presentationml/2006/main">
+  <p:cSld>
+    <p:spTree>
+      <p:nvGrpSpPr>
+        <p:cNvPr id="1" name=""/>
+        <p:cNvGrpSpPr/>
+        <p:nvPr/>
+      </p:nvGrpSpPr>
+      <p:grpSpPr>
+        <a:xfrm>
+          <a:off x="0" y="0"/>
+          <a:ext cx="0" cy="0"/>
+          <a:chOff x="0" y="0"/>
+          <a:chExt cx="0" cy="0"/>
+        </a:xfrm>
+      </p:grpSpPr>
+      <p:sp>
+        <p:nvSpPr>
+          <p:cNvPr id="2" name="Title 1">
+            <a:extLst>
+              <a:ext uri="{FF2B5EF4-FFF2-40B4-BE49-F238E27FC236}">
                 <a16:creationId xmlns:a16="http://schemas.microsoft.com/office/drawing/2014/main" id="{9EFC22FF-EA62-2906-6FB3-7DBA86ED9024}"/>
               </a:ext>
             </a:extLst>
@@ -3492,7 +3656,7 @@
 </p:sld>
 </file>
 
-<file path=ppt/slides/slide11.xml><?xml version="1.0" encoding="utf-8"?>
+<file path=ppt/slides/slide12.xml><?xml version="1.0" encoding="utf-8"?>
 <p:sld xmlns:a="http://schemas.openxmlformats.org/drawingml/2006/main" xmlns:r="http://schemas.openxmlformats.org/officeDocument/2006/relationships" xmlns:p="http://schemas.openxmlformats.org/presentationml/2006/main">
   <p:cSld>
     <p:spTree>
@@ -3580,7 +3744,7 @@
 </p:sld>
 </file>
 
-<file path=ppt/slides/slide12.xml><?xml version="1.0" encoding="utf-8"?>
+<file path=ppt/slides/slide13.xml><?xml version="1.0" encoding="utf-8"?>
 <p:sld xmlns:a="http://schemas.openxmlformats.org/drawingml/2006/main" xmlns:r="http://schemas.openxmlformats.org/officeDocument/2006/relationships" xmlns:p="http://schemas.openxmlformats.org/presentationml/2006/main">
   <p:cSld>
     <p:spTree>
@@ -3665,7 +3829,7 @@
 </p:sld>
 </file>
 
-<file path=ppt/slides/slide13.xml><?xml version="1.0" encoding="utf-8"?>
+<file path=ppt/slides/slide14.xml><?xml version="1.0" encoding="utf-8"?>
 <p:sld xmlns:a="http://schemas.openxmlformats.org/drawingml/2006/main" xmlns:r="http://schemas.openxmlformats.org/officeDocument/2006/relationships" xmlns:p="http://schemas.openxmlformats.org/presentationml/2006/main">
   <p:cSld>
     <p:spTree>
@@ -3750,7 +3914,7 @@
 </p:sld>
 </file>
 
-<file path=ppt/slides/slide14.xml><?xml version="1.0" encoding="utf-8"?>
+<file path=ppt/slides/slide15.xml><?xml version="1.0" encoding="utf-8"?>
 <p:sld xmlns:a="http://schemas.openxmlformats.org/drawingml/2006/main" xmlns:r="http://schemas.openxmlformats.org/officeDocument/2006/relationships" xmlns:p="http://schemas.openxmlformats.org/presentationml/2006/main">
   <p:cSld>
     <p:spTree>
@@ -3973,6 +4137,188 @@
           <p:cNvPr id="2" name="Title 1">
             <a:extLst>
               <a:ext uri="{FF2B5EF4-FFF2-40B4-BE49-F238E27FC236}">
+                <a16:creationId xmlns:a16="http://schemas.microsoft.com/office/drawing/2014/main" id="{FFD56607-90CA-5EA2-105F-7576AC90879C}"/>
+              </a:ext>
+            </a:extLst>
+          </p:cNvPr>
+          <p:cNvSpPr>
+            <a:spLocks noGrp="1"/>
+          </p:cNvSpPr>
+          <p:nvPr>
+            <p:ph type="title"/>
+          </p:nvPr>
+        </p:nvSpPr>
+        <p:spPr>
+          <a:xfrm>
+            <a:off x="2326277" y="237331"/>
+            <a:ext cx="7539445" cy="1417298"/>
+          </a:xfrm>
+        </p:spPr>
+        <p:txBody>
+          <a:bodyPr/>
+          <a:lstStyle/>
+          <a:p>
+            <a:r>
+              <a:rPr lang="en-US" dirty="0"/>
+              <a:t>Exploratory Data Analyses (EDA)</a:t>
+            </a:r>
+            <a:br>
+              <a:rPr lang="en-US" dirty="0"/>
+            </a:br>
+            <a:endParaRPr lang="en-US" dirty="0"/>
+          </a:p>
+        </p:txBody>
+      </p:sp>
+      <p:sp>
+        <p:nvSpPr>
+          <p:cNvPr id="3" name="Content Placeholder 2">
+            <a:extLst>
+              <a:ext uri="{FF2B5EF4-FFF2-40B4-BE49-F238E27FC236}">
+                <a16:creationId xmlns:a16="http://schemas.microsoft.com/office/drawing/2014/main" id="{BB679AE4-FBBF-0389-450E-F047CEBD42A1}"/>
+              </a:ext>
+            </a:extLst>
+          </p:cNvPr>
+          <p:cNvSpPr>
+            <a:spLocks noGrp="1"/>
+          </p:cNvSpPr>
+          <p:nvPr>
+            <p:ph idx="1"/>
+          </p:nvPr>
+        </p:nvSpPr>
+        <p:spPr>
+          <a:xfrm>
+            <a:off x="838200" y="1825625"/>
+            <a:ext cx="10515600" cy="4958352"/>
+          </a:xfrm>
+        </p:spPr>
+        <p:txBody>
+          <a:bodyPr/>
+          <a:lstStyle/>
+          <a:p>
+            <a:endParaRPr lang="en-US" dirty="0"/>
+          </a:p>
+          <a:p>
+            <a:r>
+              <a:rPr lang="en-US" dirty="0"/>
+              <a:t>The data set contains 21 covariates and </a:t>
+            </a:r>
+            <a:r>
+              <a:rPr lang="en-US" b="0" i="0" u="none" strike="noStrike" dirty="0">
+                <a:solidFill>
+                  <a:srgbClr val="303030"/>
+                </a:solidFill>
+                <a:effectLst/>
+                <a:latin typeface="ui-sans-serif"/>
+              </a:rPr>
+              <a:t>253680</a:t>
+            </a:r>
+            <a:r>
+              <a:rPr lang="en-US" dirty="0"/>
+              <a:t> cases</a:t>
+            </a:r>
+          </a:p>
+          <a:p>
+            <a:pPr lvl="1"/>
+            <a:r>
+              <a:rPr lang="en-US" dirty="0"/>
+              <a:t>3 numeric covariates</a:t>
+            </a:r>
+          </a:p>
+          <a:p>
+            <a:pPr lvl="1"/>
+            <a:r>
+              <a:rPr lang="en-US" dirty="0"/>
+              <a:t>18 categorical covariates</a:t>
+            </a:r>
+          </a:p>
+          <a:p>
+            <a:pPr marL="457200" lvl="1" indent="0">
+              <a:buNone/>
+            </a:pPr>
+            <a:endParaRPr lang="en-US" dirty="0"/>
+          </a:p>
+          <a:p>
+            <a:r>
+              <a:rPr lang="en-US" dirty="0"/>
+              <a:t>There is no missing, duplicated, or extreme values</a:t>
+            </a:r>
+          </a:p>
+          <a:p>
+            <a:endParaRPr lang="en-US" dirty="0"/>
+          </a:p>
+          <a:p>
+            <a:r>
+              <a:rPr lang="en-US" dirty="0"/>
+              <a:t> Binary outcome (Diabetes/No diabetes), </a:t>
+            </a:r>
+            <a:r>
+              <a:rPr lang="en-US" b="1" dirty="0"/>
+              <a:t>Classification</a:t>
+            </a:r>
+            <a:r>
+              <a:rPr lang="en-US" dirty="0"/>
+              <a:t> </a:t>
+            </a:r>
+          </a:p>
+          <a:p>
+            <a:pPr lvl="1"/>
+            <a:r>
+              <a:rPr lang="en-US" dirty="0"/>
+              <a:t>Number of those with diabetes = 35,346 , Proportion (Diabetes) = 14 %</a:t>
+            </a:r>
+          </a:p>
+          <a:p>
+            <a:pPr lvl="1"/>
+            <a:r>
+              <a:rPr lang="en-US" dirty="0"/>
+              <a:t>Imbalanced class -&gt; Down sampling was applied and now (35,346 each)</a:t>
+            </a:r>
+          </a:p>
+          <a:p>
+            <a:pPr lvl="1"/>
+            <a:endParaRPr lang="en-US" dirty="0"/>
+          </a:p>
+          <a:p>
+            <a:pPr lvl="1"/>
+            <a:endParaRPr lang="en-US" dirty="0"/>
+          </a:p>
+        </p:txBody>
+      </p:sp>
+    </p:spTree>
+    <p:extLst>
+      <p:ext uri="{BB962C8B-B14F-4D97-AF65-F5344CB8AC3E}">
+        <p14:creationId xmlns:p14="http://schemas.microsoft.com/office/powerpoint/2010/main" val="4229819415"/>
+      </p:ext>
+    </p:extLst>
+  </p:cSld>
+  <p:clrMapOvr>
+    <a:masterClrMapping/>
+  </p:clrMapOvr>
+</p:sld>
+</file>
+
+<file path=ppt/slides/slide4.xml><?xml version="1.0" encoding="utf-8"?>
+<p:sld xmlns:a="http://schemas.openxmlformats.org/drawingml/2006/main" xmlns:r="http://schemas.openxmlformats.org/officeDocument/2006/relationships" xmlns:p="http://schemas.openxmlformats.org/presentationml/2006/main">
+  <p:cSld>
+    <p:spTree>
+      <p:nvGrpSpPr>
+        <p:cNvPr id="1" name=""/>
+        <p:cNvGrpSpPr/>
+        <p:nvPr/>
+      </p:nvGrpSpPr>
+      <p:grpSpPr>
+        <a:xfrm>
+          <a:off x="0" y="0"/>
+          <a:ext cx="0" cy="0"/>
+          <a:chOff x="0" y="0"/>
+          <a:chExt cx="0" cy="0"/>
+        </a:xfrm>
+      </p:grpSpPr>
+      <p:sp>
+        <p:nvSpPr>
+          <p:cNvPr id="2" name="Title 1">
+            <a:extLst>
+              <a:ext uri="{FF2B5EF4-FFF2-40B4-BE49-F238E27FC236}">
                 <a16:creationId xmlns:a16="http://schemas.microsoft.com/office/drawing/2014/main" id="{BB6AFBBD-8FA8-B6F7-6FA6-618EED8DB698}"/>
               </a:ext>
             </a:extLst>
@@ -3991,8 +4337,13 @@
           <a:p>
             <a:r>
               <a:rPr lang="en-US" dirty="0"/>
-              <a:t>Summary Table</a:t>
-            </a:r>
+              <a:t>Summary Table </a:t>
+            </a:r>
+            <a:r>
+              <a:rPr lang="en-US"/>
+              <a:t>and Variable Selection</a:t>
+            </a:r>
+            <a:endParaRPr lang="en-US" dirty="0"/>
           </a:p>
         </p:txBody>
       </p:sp>
@@ -4041,7 +4392,7 @@
 </p:sld>
 </file>
 
-<file path=ppt/slides/slide4.xml><?xml version="1.0" encoding="utf-8"?>
+<file path=ppt/slides/slide5.xml><?xml version="1.0" encoding="utf-8"?>
 <p:sld xmlns:a="http://schemas.openxmlformats.org/drawingml/2006/main" xmlns:r="http://schemas.openxmlformats.org/officeDocument/2006/relationships" xmlns:p="http://schemas.openxmlformats.org/presentationml/2006/main">
   <p:cSld>
     <p:spTree>
@@ -4128,7 +4479,7 @@
 </p:sld>
 </file>
 
-<file path=ppt/slides/slide5.xml><?xml version="1.0" encoding="utf-8"?>
+<file path=ppt/slides/slide6.xml><?xml version="1.0" encoding="utf-8"?>
 <p:sld xmlns:a="http://schemas.openxmlformats.org/drawingml/2006/main" xmlns:r="http://schemas.openxmlformats.org/officeDocument/2006/relationships" xmlns:p="http://schemas.openxmlformats.org/presentationml/2006/main">
   <p:cSld>
     <p:spTree>
@@ -4215,7 +4566,7 @@
 </p:sld>
 </file>
 
-<file path=ppt/slides/slide6.xml><?xml version="1.0" encoding="utf-8"?>
+<file path=ppt/slides/slide7.xml><?xml version="1.0" encoding="utf-8"?>
 <p:sld xmlns:a="http://schemas.openxmlformats.org/drawingml/2006/main" xmlns:r="http://schemas.openxmlformats.org/officeDocument/2006/relationships" xmlns:p="http://schemas.openxmlformats.org/presentationml/2006/main">
   <p:cSld>
     <p:spTree>
@@ -4302,7 +4653,7 @@
 </p:sld>
 </file>
 
-<file path=ppt/slides/slide7.xml><?xml version="1.0" encoding="utf-8"?>
+<file path=ppt/slides/slide8.xml><?xml version="1.0" encoding="utf-8"?>
 <p:sld xmlns:a="http://schemas.openxmlformats.org/drawingml/2006/main" xmlns:r="http://schemas.openxmlformats.org/officeDocument/2006/relationships" xmlns:p="http://schemas.openxmlformats.org/presentationml/2006/main">
   <p:cSld>
     <p:spTree>
@@ -4389,7 +4740,7 @@
 </p:sld>
 </file>
 
-<file path=ppt/slides/slide8.xml><?xml version="1.0" encoding="utf-8"?>
+<file path=ppt/slides/slide9.xml><?xml version="1.0" encoding="utf-8"?>
 <p:sld xmlns:a="http://schemas.openxmlformats.org/drawingml/2006/main" xmlns:r="http://schemas.openxmlformats.org/officeDocument/2006/relationships" xmlns:p="http://schemas.openxmlformats.org/presentationml/2006/main">
   <p:cSld>
     <p:spTree>
@@ -4475,96 +4826,6 @@
     <p:extLst>
       <p:ext uri="{BB962C8B-B14F-4D97-AF65-F5344CB8AC3E}">
         <p14:creationId xmlns:p14="http://schemas.microsoft.com/office/powerpoint/2010/main" val="1586149852"/>
-      </p:ext>
-    </p:extLst>
-  </p:cSld>
-  <p:clrMapOvr>
-    <a:masterClrMapping/>
-  </p:clrMapOvr>
-</p:sld>
-</file>
-
-<file path=ppt/slides/slide9.xml><?xml version="1.0" encoding="utf-8"?>
-<p:sld xmlns:a="http://schemas.openxmlformats.org/drawingml/2006/main" xmlns:r="http://schemas.openxmlformats.org/officeDocument/2006/relationships" xmlns:p="http://schemas.openxmlformats.org/presentationml/2006/main">
-  <p:cSld>
-    <p:spTree>
-      <p:nvGrpSpPr>
-        <p:cNvPr id="1" name=""/>
-        <p:cNvGrpSpPr/>
-        <p:nvPr/>
-      </p:nvGrpSpPr>
-      <p:grpSpPr>
-        <a:xfrm>
-          <a:off x="0" y="0"/>
-          <a:ext cx="0" cy="0"/>
-          <a:chOff x="0" y="0"/>
-          <a:chExt cx="0" cy="0"/>
-        </a:xfrm>
-      </p:grpSpPr>
-      <p:sp>
-        <p:nvSpPr>
-          <p:cNvPr id="2" name="Title 1">
-            <a:extLst>
-              <a:ext uri="{FF2B5EF4-FFF2-40B4-BE49-F238E27FC236}">
-                <a16:creationId xmlns:a16="http://schemas.microsoft.com/office/drawing/2014/main" id="{FF416512-3780-C9DD-6A53-05CFA6B1EC27}"/>
-              </a:ext>
-            </a:extLst>
-          </p:cNvPr>
-          <p:cNvSpPr>
-            <a:spLocks noGrp="1"/>
-          </p:cNvSpPr>
-          <p:nvPr>
-            <p:ph type="title"/>
-          </p:nvPr>
-        </p:nvSpPr>
-        <p:spPr/>
-        <p:txBody>
-          <a:bodyPr/>
-          <a:lstStyle/>
-          <a:p>
-            <a:r>
-              <a:rPr lang="en-US" dirty="0"/>
-              <a:t>Cross-validation results</a:t>
-            </a:r>
-          </a:p>
-        </p:txBody>
-      </p:sp>
-      <p:pic>
-        <p:nvPicPr>
-          <p:cNvPr id="4" name="Content Placeholder 3">
-            <a:extLst>
-              <a:ext uri="{FF2B5EF4-FFF2-40B4-BE49-F238E27FC236}">
-                <a16:creationId xmlns:a16="http://schemas.microsoft.com/office/drawing/2014/main" id="{9F6AE2F4-BCAE-B306-252F-C9DA15AF4D83}"/>
-              </a:ext>
-            </a:extLst>
-          </p:cNvPr>
-          <p:cNvPicPr>
-            <a:picLocks noGrp="1" noChangeAspect="1"/>
-          </p:cNvPicPr>
-          <p:nvPr>
-            <p:ph idx="1"/>
-          </p:nvPr>
-        </p:nvPicPr>
-        <p:blipFill>
-          <a:blip r:embed="rId2"/>
-          <a:stretch>
-            <a:fillRect/>
-          </a:stretch>
-        </p:blipFill>
-        <p:spPr>
-          <a:xfrm>
-            <a:off x="2657862" y="1405054"/>
-            <a:ext cx="7700842" cy="4950541"/>
-          </a:xfrm>
-          <a:prstGeom prst="rect">
-            <a:avLst/>
-          </a:prstGeom>
-        </p:spPr>
-      </p:pic>
-    </p:spTree>
-    <p:extLst>
-      <p:ext uri="{BB962C8B-B14F-4D97-AF65-F5344CB8AC3E}">
-        <p14:creationId xmlns:p14="http://schemas.microsoft.com/office/powerpoint/2010/main" val="1994282741"/>
       </p:ext>
     </p:extLst>
   </p:cSld>

</xml_diff>